<commit_message>
Separate data prep from data analysis
Yotam
</commit_message>
<xml_diff>
--- a/Kickstarter Oracle.pptx
+++ b/Kickstarter Oracle.pptx
@@ -524,29 +524,10 @@
           <a:bodyPr/>
           <a:lstStyle/>
           <a:p>
-            <a:pPr marL="228600" indent="-228600">
-              <a:buAutoNum type="arabicPeriod"/>
-            </a:pPr>
-            <a:r>
-              <a:rPr lang="he-IL" baseline="0" dirty="0"/>
-              <a:t>חיזוי הצלחת קמפיין גיוס </a:t>
-            </a:r>
-          </a:p>
-          <a:p>
-            <a:pPr marL="228600" indent="-228600">
-              <a:buAutoNum type="arabicPeriod"/>
-            </a:pPr>
-            <a:r>
-              <a:rPr lang="he-IL" baseline="0" dirty="0"/>
-              <a:t>לספק תובנות אשר נוגעות לטרנדים הקיימים בשוק, לזהות ערכיות פרמטרים וקטגוריות ספציפיים (כמו למשל- לקבוע את יעד הגיוס)</a:t>
-            </a:r>
-            <a:endParaRPr lang="en-US" baseline="0" dirty="0"/>
-          </a:p>
-          <a:p>
-            <a:pPr marL="0" indent="0">
-              <a:buNone/>
-            </a:pPr>
-            <a:endParaRPr lang="he-IL" dirty="0"/>
+            <a:r>
+              <a:rPr lang="en-US" dirty="0"/>
+              <a:t>Need to add the reference</a:t>
+            </a:r>
           </a:p>
         </p:txBody>
       </p:sp>
@@ -557,7 +538,7 @@
             <a:spLocks noGrp="1"/>
           </p:cNvSpPr>
           <p:nvPr>
-            <p:ph type="sldNum" sz="quarter" idx="10"/>
+            <p:ph type="sldNum" sz="quarter" idx="5"/>
           </p:nvPr>
         </p:nvSpPr>
         <p:spPr/>
@@ -567,7 +548,7 @@
           <a:p>
             <a:fld id="{5F24B096-1E99-4671-A369-18357348B9E8}" type="slidenum">
               <a:rPr lang="he-IL" smtClean="0"/>
-              <a:t>5</a:t>
+              <a:t>4</a:t>
             </a:fld>
             <a:endParaRPr lang="he-IL"/>
           </a:p>
@@ -576,7 +557,105 @@
     </p:spTree>
     <p:extLst>
       <p:ext uri="{BB962C8B-B14F-4D97-AF65-F5344CB8AC3E}">
-        <p14:creationId xmlns:p14="http://schemas.microsoft.com/office/powerpoint/2010/main" val="2487202045"/>
+        <p14:creationId xmlns:p14="http://schemas.microsoft.com/office/powerpoint/2010/main" val="3040976493"/>
+      </p:ext>
+    </p:extLst>
+  </p:cSld>
+  <p:clrMapOvr>
+    <a:masterClrMapping/>
+  </p:clrMapOvr>
+</p:notes>
+</file>
+
+<file path=ppt/notesSlides/notesSlide10.xml><?xml version="1.0" encoding="utf-8"?>
+<p:notes xmlns:a="http://schemas.openxmlformats.org/drawingml/2006/main" xmlns:r="http://schemas.openxmlformats.org/officeDocument/2006/relationships" xmlns:p="http://schemas.openxmlformats.org/presentationml/2006/main">
+  <p:cSld>
+    <p:spTree>
+      <p:nvGrpSpPr>
+        <p:cNvPr id="1" name=""/>
+        <p:cNvGrpSpPr/>
+        <p:nvPr/>
+      </p:nvGrpSpPr>
+      <p:grpSpPr>
+        <a:xfrm>
+          <a:off x="0" y="0"/>
+          <a:ext cx="0" cy="0"/>
+          <a:chOff x="0" y="0"/>
+          <a:chExt cx="0" cy="0"/>
+        </a:xfrm>
+      </p:grpSpPr>
+      <p:sp>
+        <p:nvSpPr>
+          <p:cNvPr id="2" name="Slide Image Placeholder 1"/>
+          <p:cNvSpPr>
+            <a:spLocks noGrp="1" noRot="1" noChangeAspect="1"/>
+          </p:cNvSpPr>
+          <p:nvPr>
+            <p:ph type="sldImg"/>
+          </p:nvPr>
+        </p:nvSpPr>
+        <p:spPr/>
+      </p:sp>
+      <p:sp>
+        <p:nvSpPr>
+          <p:cNvPr id="3" name="Notes Placeholder 2"/>
+          <p:cNvSpPr>
+            <a:spLocks noGrp="1"/>
+          </p:cNvSpPr>
+          <p:nvPr>
+            <p:ph type="body" idx="1"/>
+          </p:nvPr>
+        </p:nvSpPr>
+        <p:spPr/>
+        <p:txBody>
+          <a:bodyPr/>
+          <a:lstStyle/>
+          <a:p>
+            <a:r>
+              <a:rPr lang="en-US" dirty="0"/>
+              <a:t>Need to add histograms, need to do a regression system to predict the pass/fail </a:t>
+            </a:r>
+          </a:p>
+          <a:p>
+            <a:r>
+              <a:rPr lang="en-US" dirty="0"/>
+              <a:t>Present </a:t>
+            </a:r>
+            <a:r>
+              <a:rPr lang="en-US"/>
+              <a:t>a simple tree</a:t>
+            </a:r>
+            <a:endParaRPr lang="en-US" dirty="0"/>
+          </a:p>
+        </p:txBody>
+      </p:sp>
+      <p:sp>
+        <p:nvSpPr>
+          <p:cNvPr id="4" name="Slide Number Placeholder 3"/>
+          <p:cNvSpPr>
+            <a:spLocks noGrp="1"/>
+          </p:cNvSpPr>
+          <p:nvPr>
+            <p:ph type="sldNum" sz="quarter" idx="5"/>
+          </p:nvPr>
+        </p:nvSpPr>
+        <p:spPr/>
+        <p:txBody>
+          <a:bodyPr/>
+          <a:lstStyle/>
+          <a:p>
+            <a:fld id="{5F24B096-1E99-4671-A369-18357348B9E8}" type="slidenum">
+              <a:rPr lang="he-IL" smtClean="0"/>
+              <a:t>16</a:t>
+            </a:fld>
+            <a:endParaRPr lang="he-IL"/>
+          </a:p>
+        </p:txBody>
+      </p:sp>
+    </p:spTree>
+    <p:extLst>
+      <p:ext uri="{BB962C8B-B14F-4D97-AF65-F5344CB8AC3E}">
+        <p14:creationId xmlns:p14="http://schemas.microsoft.com/office/powerpoint/2010/main" val="2263659050"/>
       </p:ext>
     </p:extLst>
   </p:cSld>
@@ -630,30 +709,28 @@
           <a:bodyPr/>
           <a:lstStyle/>
           <a:p>
-            <a:r>
-              <a:rPr lang="he-IL" dirty="0"/>
-              <a:t>אין</a:t>
-            </a:r>
+            <a:pPr marL="228600" indent="-228600">
+              <a:buAutoNum type="arabicPeriod"/>
+            </a:pPr>
             <a:r>
               <a:rPr lang="he-IL" baseline="0" dirty="0"/>
-              <a:t> הלימה בין כמות </a:t>
-            </a:r>
-            <a:r>
-              <a:rPr lang="he-IL" baseline="0" dirty="0" err="1"/>
-              <a:t>הקפיינים</a:t>
-            </a:r>
+              <a:t>חיזוי הצלחת קמפיין גיוס </a:t>
+            </a:r>
+          </a:p>
+          <a:p>
+            <a:pPr marL="228600" indent="-228600">
+              <a:buAutoNum type="arabicPeriod"/>
+            </a:pPr>
             <a:r>
               <a:rPr lang="he-IL" baseline="0" dirty="0"/>
-              <a:t> המוצלחים לבין אחוז ההכנסות מגיוסים </a:t>
-            </a:r>
-            <a:r>
-              <a:rPr lang="he-IL" baseline="0" dirty="0" err="1"/>
-              <a:t>בסה</a:t>
-            </a:r>
-            <a:r>
-              <a:rPr lang="he-IL" baseline="0" dirty="0"/>
-              <a:t>''כ</a:t>
-            </a:r>
+              <a:t>לספק תובנות אשר נוגעות לטרנדים הקיימים בשוק, לזהות ערכיות פרמטרים וקטגוריות ספציפיים (כמו למשל- לקבוע את יעד הגיוס)</a:t>
+            </a:r>
+            <a:endParaRPr lang="en-US" baseline="0" dirty="0"/>
+          </a:p>
+          <a:p>
+            <a:pPr marL="0" indent="0">
+              <a:buNone/>
+            </a:pPr>
             <a:endParaRPr lang="he-IL" dirty="0"/>
           </a:p>
         </p:txBody>
@@ -675,7 +752,7 @@
           <a:p>
             <a:fld id="{5F24B096-1E99-4671-A369-18357348B9E8}" type="slidenum">
               <a:rPr lang="he-IL" smtClean="0"/>
-              <a:t>7</a:t>
+              <a:t>5</a:t>
             </a:fld>
             <a:endParaRPr lang="he-IL"/>
           </a:p>
@@ -684,7 +761,7 @@
     </p:spTree>
     <p:extLst>
       <p:ext uri="{BB962C8B-B14F-4D97-AF65-F5344CB8AC3E}">
-        <p14:creationId xmlns:p14="http://schemas.microsoft.com/office/powerpoint/2010/main" val="1404238682"/>
+        <p14:creationId xmlns:p14="http://schemas.microsoft.com/office/powerpoint/2010/main" val="2487202045"/>
       </p:ext>
     </p:extLst>
   </p:cSld>
@@ -738,61 +815,30 @@
           <a:bodyPr/>
           <a:lstStyle/>
           <a:p>
-            <a:pPr marL="228600" indent="-228600">
-              <a:buAutoNum type="arabicPeriod"/>
-            </a:pPr>
+            <a:r>
+              <a:rPr lang="he-IL" dirty="0"/>
+              <a:t>אין</a:t>
+            </a:r>
             <a:r>
               <a:rPr lang="he-IL" baseline="0" dirty="0"/>
-              <a:t>זה המידע שבסוף אנחנו עובדים </a:t>
+              <a:t> הלימה בין כמות </a:t>
             </a:r>
             <a:r>
               <a:rPr lang="he-IL" baseline="0" dirty="0" err="1"/>
-              <a:t>איתו</a:t>
-            </a:r>
-            <a:endParaRPr lang="he-IL" baseline="0" dirty="0"/>
-          </a:p>
-          <a:p>
-            <a:pPr marL="228600" indent="-228600">
-              <a:buAutoNum type="arabicPeriod"/>
-            </a:pPr>
-            <a:r>
-              <a:rPr lang="en-US" baseline="0" dirty="0"/>
-              <a:t>Created</a:t>
+              <a:t>הקפיינים</a:t>
             </a:r>
             <a:r>
               <a:rPr lang="he-IL" baseline="0" dirty="0"/>
-              <a:t>- נוצר</a:t>
-            </a:r>
-            <a:endParaRPr lang="en-US" baseline="0" dirty="0"/>
-          </a:p>
-          <a:p>
-            <a:pPr marL="228600" indent="-228600">
-              <a:buAutoNum type="arabicPeriod"/>
-            </a:pPr>
-            <a:r>
-              <a:rPr lang="en-US" baseline="0" dirty="0"/>
-              <a:t>Lunched</a:t>
+              <a:t> המוצלחים לבין אחוז ההכנסות מגיוסים </a:t>
+            </a:r>
+            <a:r>
+              <a:rPr lang="he-IL" baseline="0" dirty="0" err="1"/>
+              <a:t>בסה</a:t>
             </a:r>
             <a:r>
               <a:rPr lang="he-IL" baseline="0" dirty="0"/>
-              <a:t>- הושק הקמפיין</a:t>
-            </a:r>
-            <a:endParaRPr lang="en-US" baseline="0" dirty="0"/>
-          </a:p>
-          <a:p>
-            <a:pPr marL="228600" indent="-228600">
-              <a:buAutoNum type="arabicPeriod"/>
-            </a:pPr>
-            <a:r>
-              <a:rPr lang="en-US" baseline="0"/>
-              <a:t>Deadline</a:t>
-            </a:r>
-            <a:endParaRPr lang="he-IL" baseline="0" dirty="0"/>
-          </a:p>
-          <a:p>
-            <a:pPr marL="0" indent="0">
-              <a:buNone/>
-            </a:pPr>
+              <a:t>''כ</a:t>
+            </a:r>
             <a:endParaRPr lang="he-IL" dirty="0"/>
           </a:p>
         </p:txBody>
@@ -814,7 +860,7 @@
           <a:p>
             <a:fld id="{5F24B096-1E99-4671-A369-18357348B9E8}" type="slidenum">
               <a:rPr lang="he-IL" smtClean="0"/>
-              <a:t>8</a:t>
+              <a:t>7</a:t>
             </a:fld>
             <a:endParaRPr lang="he-IL"/>
           </a:p>
@@ -823,7 +869,7 @@
     </p:spTree>
     <p:extLst>
       <p:ext uri="{BB962C8B-B14F-4D97-AF65-F5344CB8AC3E}">
-        <p14:creationId xmlns:p14="http://schemas.microsoft.com/office/powerpoint/2010/main" val="807451968"/>
+        <p14:creationId xmlns:p14="http://schemas.microsoft.com/office/powerpoint/2010/main" val="1404238682"/>
       </p:ext>
     </p:extLst>
   </p:cSld>
@@ -877,6 +923,61 @@
           <a:bodyPr/>
           <a:lstStyle/>
           <a:p>
+            <a:pPr marL="228600" indent="-228600">
+              <a:buAutoNum type="arabicPeriod"/>
+            </a:pPr>
+            <a:r>
+              <a:rPr lang="he-IL" baseline="0" dirty="0"/>
+              <a:t>זה המידע שבסוף אנחנו עובדים </a:t>
+            </a:r>
+            <a:r>
+              <a:rPr lang="he-IL" baseline="0" dirty="0" err="1"/>
+              <a:t>איתו</a:t>
+            </a:r>
+            <a:endParaRPr lang="he-IL" baseline="0" dirty="0"/>
+          </a:p>
+          <a:p>
+            <a:pPr marL="228600" indent="-228600">
+              <a:buAutoNum type="arabicPeriod"/>
+            </a:pPr>
+            <a:r>
+              <a:rPr lang="en-US" baseline="0" dirty="0"/>
+              <a:t>Created</a:t>
+            </a:r>
+            <a:r>
+              <a:rPr lang="he-IL" baseline="0" dirty="0"/>
+              <a:t>- נוצר</a:t>
+            </a:r>
+            <a:endParaRPr lang="en-US" baseline="0" dirty="0"/>
+          </a:p>
+          <a:p>
+            <a:pPr marL="228600" indent="-228600">
+              <a:buAutoNum type="arabicPeriod"/>
+            </a:pPr>
+            <a:r>
+              <a:rPr lang="en-US" baseline="0" dirty="0"/>
+              <a:t>Lunched</a:t>
+            </a:r>
+            <a:r>
+              <a:rPr lang="he-IL" baseline="0" dirty="0"/>
+              <a:t>- הושק הקמפיין</a:t>
+            </a:r>
+            <a:endParaRPr lang="en-US" baseline="0" dirty="0"/>
+          </a:p>
+          <a:p>
+            <a:pPr marL="228600" indent="-228600">
+              <a:buAutoNum type="arabicPeriod"/>
+            </a:pPr>
+            <a:r>
+              <a:rPr lang="en-US" baseline="0"/>
+              <a:t>Deadline</a:t>
+            </a:r>
+            <a:endParaRPr lang="he-IL" baseline="0" dirty="0"/>
+          </a:p>
+          <a:p>
+            <a:pPr marL="0" indent="0">
+              <a:buNone/>
+            </a:pPr>
             <a:endParaRPr lang="he-IL" dirty="0"/>
           </a:p>
         </p:txBody>
@@ -898,7 +999,7 @@
           <a:p>
             <a:fld id="{5F24B096-1E99-4671-A369-18357348B9E8}" type="slidenum">
               <a:rPr lang="he-IL" smtClean="0"/>
-              <a:t>10</a:t>
+              <a:t>8</a:t>
             </a:fld>
             <a:endParaRPr lang="he-IL"/>
           </a:p>
@@ -907,7 +1008,7 @@
     </p:spTree>
     <p:extLst>
       <p:ext uri="{BB962C8B-B14F-4D97-AF65-F5344CB8AC3E}">
-        <p14:creationId xmlns:p14="http://schemas.microsoft.com/office/powerpoint/2010/main" val="2516064041"/>
+        <p14:creationId xmlns:p14="http://schemas.microsoft.com/office/powerpoint/2010/main" val="807451968"/>
       </p:ext>
     </p:extLst>
   </p:cSld>
@@ -961,97 +1062,6 @@
           <a:bodyPr/>
           <a:lstStyle/>
           <a:p>
-            <a:r>
-              <a:rPr lang="he-IL" dirty="0"/>
-              <a:t>1. יחס הגיוס</a:t>
-            </a:r>
-            <a:r>
-              <a:rPr lang="he-IL" baseline="0" dirty="0"/>
-              <a:t> של קמפיינים ש</a:t>
-            </a:r>
-            <a:r>
-              <a:rPr lang="he-IL" b="1" baseline="0" dirty="0"/>
-              <a:t>הצליחו</a:t>
-            </a:r>
-            <a:r>
-              <a:rPr lang="he-IL" baseline="0" dirty="0"/>
-              <a:t>.</a:t>
-            </a:r>
-          </a:p>
-          <a:p>
-            <a:r>
-              <a:rPr lang="he-IL" baseline="0" dirty="0"/>
-              <a:t>2. מראה שלמרות שלקמפיינים </a:t>
-            </a:r>
-            <a:r>
-              <a:rPr lang="he-IL" baseline="0" dirty="0" err="1"/>
-              <a:t>ה''קטנים</a:t>
-            </a:r>
-            <a:r>
-              <a:rPr lang="he-IL" baseline="0" dirty="0"/>
-              <a:t>'' (ספרים/הופעות/אומנות) יש סיכוי גבוה יותר להצליח לעמוד ביעד, ניתן לראות שבתחומים </a:t>
-            </a:r>
-            <a:r>
-              <a:rPr lang="he-IL" baseline="0" dirty="0" err="1"/>
-              <a:t>מסויימים</a:t>
-            </a:r>
-            <a:r>
-              <a:rPr lang="he-IL" baseline="0" dirty="0"/>
-              <a:t> (כמו טכנולוגיה ומשחקים) פרויקט שכבר צלח- עתיד לגייס הרבה יותר מהיעד.</a:t>
-            </a:r>
-          </a:p>
-          <a:p>
-            <a:r>
-              <a:rPr lang="he-IL" baseline="0" dirty="0"/>
-              <a:t>3. שני פרמטרים לקביעת יעד גיוס- כמה הפרויקט </a:t>
-            </a:r>
-            <a:r>
-              <a:rPr lang="he-IL" b="1" baseline="0" dirty="0"/>
-              <a:t>צריך</a:t>
-            </a:r>
-            <a:r>
-              <a:rPr lang="he-IL" b="0" baseline="0" dirty="0"/>
-              <a:t> ומה הסכום שיגרום לציבור להצליח ''לסגור'' את הגיוס</a:t>
-            </a:r>
-            <a:endParaRPr lang="he-IL" baseline="0" dirty="0"/>
-          </a:p>
-          <a:p>
-            <a:r>
-              <a:rPr lang="he-IL" baseline="0" dirty="0"/>
-              <a:t>4. למשל- חברה שצריכה לגייס 10</a:t>
-            </a:r>
-            <a:r>
-              <a:rPr lang="en-US" baseline="0" dirty="0"/>
-              <a:t>K</a:t>
-            </a:r>
-            <a:r>
-              <a:rPr lang="he-IL" baseline="0" dirty="0"/>
-              <a:t> (זו </a:t>
-            </a:r>
-            <a:r>
-              <a:rPr lang="he-IL" b="1" baseline="0" dirty="0"/>
-              <a:t>עלות הפרויקט</a:t>
-            </a:r>
-            <a:r>
-              <a:rPr lang="he-IL" b="0" baseline="0" dirty="0"/>
-              <a:t>) ופועלת בתחום הקומיקס, עדיף שתשים יעד של 6</a:t>
-            </a:r>
-            <a:r>
-              <a:rPr lang="en-US" b="0" baseline="0" dirty="0"/>
-              <a:t> K</a:t>
-            </a:r>
-            <a:r>
-              <a:rPr lang="he-IL" b="0" baseline="0" dirty="0"/>
-              <a:t>שבפועל יהפוך ל12</a:t>
-            </a:r>
-            <a:r>
-              <a:rPr lang="en-US" b="0" baseline="0" dirty="0"/>
-              <a:t>K</a:t>
-            </a:r>
-            <a:r>
-              <a:rPr lang="he-IL" b="0" baseline="0" dirty="0"/>
-              <a:t> (צריך לזכור שגיוס שלא הושלם ''נזרק לפח'')</a:t>
-            </a:r>
             <a:endParaRPr lang="he-IL" dirty="0"/>
           </a:p>
         </p:txBody>
@@ -1073,7 +1083,7 @@
           <a:p>
             <a:fld id="{5F24B096-1E99-4671-A369-18357348B9E8}" type="slidenum">
               <a:rPr lang="he-IL" smtClean="0"/>
-              <a:t>11</a:t>
+              <a:t>10</a:t>
             </a:fld>
             <a:endParaRPr lang="he-IL"/>
           </a:p>
@@ -1082,7 +1092,7 @@
     </p:spTree>
     <p:extLst>
       <p:ext uri="{BB962C8B-B14F-4D97-AF65-F5344CB8AC3E}">
-        <p14:creationId xmlns:p14="http://schemas.microsoft.com/office/powerpoint/2010/main" val="1973075875"/>
+        <p14:creationId xmlns:p14="http://schemas.microsoft.com/office/powerpoint/2010/main" val="2516064041"/>
       </p:ext>
     </p:extLst>
   </p:cSld>
@@ -1136,6 +1146,97 @@
           <a:bodyPr/>
           <a:lstStyle/>
           <a:p>
+            <a:r>
+              <a:rPr lang="he-IL" dirty="0"/>
+              <a:t>1. יחס הגיוס</a:t>
+            </a:r>
+            <a:r>
+              <a:rPr lang="he-IL" baseline="0" dirty="0"/>
+              <a:t> של קמפיינים ש</a:t>
+            </a:r>
+            <a:r>
+              <a:rPr lang="he-IL" b="1" baseline="0" dirty="0"/>
+              <a:t>הצליחו</a:t>
+            </a:r>
+            <a:r>
+              <a:rPr lang="he-IL" baseline="0" dirty="0"/>
+              <a:t>.</a:t>
+            </a:r>
+          </a:p>
+          <a:p>
+            <a:r>
+              <a:rPr lang="he-IL" baseline="0" dirty="0"/>
+              <a:t>2. מראה שלמרות שלקמפיינים </a:t>
+            </a:r>
+            <a:r>
+              <a:rPr lang="he-IL" baseline="0" dirty="0" err="1"/>
+              <a:t>ה''קטנים</a:t>
+            </a:r>
+            <a:r>
+              <a:rPr lang="he-IL" baseline="0" dirty="0"/>
+              <a:t>'' (ספרים/הופעות/אומנות) יש סיכוי גבוה יותר להצליח לעמוד ביעד, ניתן לראות שבתחומים </a:t>
+            </a:r>
+            <a:r>
+              <a:rPr lang="he-IL" baseline="0" dirty="0" err="1"/>
+              <a:t>מסויימים</a:t>
+            </a:r>
+            <a:r>
+              <a:rPr lang="he-IL" baseline="0" dirty="0"/>
+              <a:t> (כמו טכנולוגיה ומשחקים) פרויקט שכבר צלח- עתיד לגייס הרבה יותר מהיעד.</a:t>
+            </a:r>
+          </a:p>
+          <a:p>
+            <a:r>
+              <a:rPr lang="he-IL" baseline="0" dirty="0"/>
+              <a:t>3. שני פרמטרים לקביעת יעד גיוס- כמה הפרויקט </a:t>
+            </a:r>
+            <a:r>
+              <a:rPr lang="he-IL" b="1" baseline="0" dirty="0"/>
+              <a:t>צריך</a:t>
+            </a:r>
+            <a:r>
+              <a:rPr lang="he-IL" b="0" baseline="0" dirty="0"/>
+              <a:t> ומה הסכום שיגרום לציבור להצליח ''לסגור'' את הגיוס</a:t>
+            </a:r>
+            <a:endParaRPr lang="he-IL" baseline="0" dirty="0"/>
+          </a:p>
+          <a:p>
+            <a:r>
+              <a:rPr lang="he-IL" baseline="0" dirty="0"/>
+              <a:t>4. למשל- חברה שצריכה לגייס 10</a:t>
+            </a:r>
+            <a:r>
+              <a:rPr lang="en-US" baseline="0" dirty="0"/>
+              <a:t>K</a:t>
+            </a:r>
+            <a:r>
+              <a:rPr lang="he-IL" baseline="0" dirty="0"/>
+              <a:t> (זו </a:t>
+            </a:r>
+            <a:r>
+              <a:rPr lang="he-IL" b="1" baseline="0" dirty="0"/>
+              <a:t>עלות הפרויקט</a:t>
+            </a:r>
+            <a:r>
+              <a:rPr lang="he-IL" b="0" baseline="0" dirty="0"/>
+              <a:t>) ופועלת בתחום הקומיקס, עדיף שתשים יעד של 6</a:t>
+            </a:r>
+            <a:r>
+              <a:rPr lang="en-US" b="0" baseline="0" dirty="0"/>
+              <a:t> K</a:t>
+            </a:r>
+            <a:r>
+              <a:rPr lang="he-IL" b="0" baseline="0" dirty="0"/>
+              <a:t>שבפועל יהפוך ל12</a:t>
+            </a:r>
+            <a:r>
+              <a:rPr lang="en-US" b="0" baseline="0" dirty="0"/>
+              <a:t>K</a:t>
+            </a:r>
+            <a:r>
+              <a:rPr lang="he-IL" b="0" baseline="0" dirty="0"/>
+              <a:t> (צריך לזכור שגיוס שלא הושלם ''נזרק לפח'')</a:t>
+            </a:r>
             <a:endParaRPr lang="he-IL" dirty="0"/>
           </a:p>
         </p:txBody>
@@ -1157,7 +1258,7 @@
           <a:p>
             <a:fld id="{5F24B096-1E99-4671-A369-18357348B9E8}" type="slidenum">
               <a:rPr lang="he-IL" smtClean="0"/>
-              <a:t>12</a:t>
+              <a:t>11</a:t>
             </a:fld>
             <a:endParaRPr lang="he-IL"/>
           </a:p>
@@ -1166,7 +1267,7 @@
     </p:spTree>
     <p:extLst>
       <p:ext uri="{BB962C8B-B14F-4D97-AF65-F5344CB8AC3E}">
-        <p14:creationId xmlns:p14="http://schemas.microsoft.com/office/powerpoint/2010/main" val="4078555015"/>
+        <p14:creationId xmlns:p14="http://schemas.microsoft.com/office/powerpoint/2010/main" val="1973075875"/>
       </p:ext>
     </p:extLst>
   </p:cSld>
@@ -1241,6 +1342,90 @@
           <a:p>
             <a:fld id="{5F24B096-1E99-4671-A369-18357348B9E8}" type="slidenum">
               <a:rPr lang="he-IL" smtClean="0"/>
+              <a:t>12</a:t>
+            </a:fld>
+            <a:endParaRPr lang="he-IL"/>
+          </a:p>
+        </p:txBody>
+      </p:sp>
+    </p:spTree>
+    <p:extLst>
+      <p:ext uri="{BB962C8B-B14F-4D97-AF65-F5344CB8AC3E}">
+        <p14:creationId xmlns:p14="http://schemas.microsoft.com/office/powerpoint/2010/main" val="4078555015"/>
+      </p:ext>
+    </p:extLst>
+  </p:cSld>
+  <p:clrMapOvr>
+    <a:masterClrMapping/>
+  </p:clrMapOvr>
+</p:notes>
+</file>
+
+<file path=ppt/notesSlides/notesSlide8.xml><?xml version="1.0" encoding="utf-8"?>
+<p:notes xmlns:a="http://schemas.openxmlformats.org/drawingml/2006/main" xmlns:r="http://schemas.openxmlformats.org/officeDocument/2006/relationships" xmlns:p="http://schemas.openxmlformats.org/presentationml/2006/main">
+  <p:cSld>
+    <p:spTree>
+      <p:nvGrpSpPr>
+        <p:cNvPr id="1" name=""/>
+        <p:cNvGrpSpPr/>
+        <p:nvPr/>
+      </p:nvGrpSpPr>
+      <p:grpSpPr>
+        <a:xfrm>
+          <a:off x="0" y="0"/>
+          <a:ext cx="0" cy="0"/>
+          <a:chOff x="0" y="0"/>
+          <a:chExt cx="0" cy="0"/>
+        </a:xfrm>
+      </p:grpSpPr>
+      <p:sp>
+        <p:nvSpPr>
+          <p:cNvPr id="2" name="Slide Image Placeholder 1"/>
+          <p:cNvSpPr>
+            <a:spLocks noGrp="1" noRot="1" noChangeAspect="1"/>
+          </p:cNvSpPr>
+          <p:nvPr>
+            <p:ph type="sldImg"/>
+          </p:nvPr>
+        </p:nvSpPr>
+        <p:spPr/>
+      </p:sp>
+      <p:sp>
+        <p:nvSpPr>
+          <p:cNvPr id="3" name="Notes Placeholder 2"/>
+          <p:cNvSpPr>
+            <a:spLocks noGrp="1"/>
+          </p:cNvSpPr>
+          <p:nvPr>
+            <p:ph type="body" idx="1"/>
+          </p:nvPr>
+        </p:nvSpPr>
+        <p:spPr/>
+        <p:txBody>
+          <a:bodyPr/>
+          <a:lstStyle/>
+          <a:p>
+            <a:endParaRPr lang="he-IL" dirty="0"/>
+          </a:p>
+        </p:txBody>
+      </p:sp>
+      <p:sp>
+        <p:nvSpPr>
+          <p:cNvPr id="4" name="Slide Number Placeholder 3"/>
+          <p:cNvSpPr>
+            <a:spLocks noGrp="1"/>
+          </p:cNvSpPr>
+          <p:nvPr>
+            <p:ph type="sldNum" sz="quarter" idx="10"/>
+          </p:nvPr>
+        </p:nvSpPr>
+        <p:spPr/>
+        <p:txBody>
+          <a:bodyPr/>
+          <a:lstStyle/>
+          <a:p>
+            <a:fld id="{5F24B096-1E99-4671-A369-18357348B9E8}" type="slidenum">
+              <a:rPr lang="he-IL" smtClean="0"/>
               <a:t>13</a:t>
             </a:fld>
             <a:endParaRPr lang="he-IL"/>
@@ -1260,7 +1445,7 @@
 </p:notes>
 </file>
 
-<file path=ppt/notesSlides/notesSlide8.xml><?xml version="1.0" encoding="utf-8"?>
+<file path=ppt/notesSlides/notesSlide9.xml><?xml version="1.0" encoding="utf-8"?>
 <p:notes xmlns:a="http://schemas.openxmlformats.org/drawingml/2006/main" xmlns:r="http://schemas.openxmlformats.org/officeDocument/2006/relationships" xmlns:p="http://schemas.openxmlformats.org/presentationml/2006/main">
   <p:cSld>
     <p:spTree>
@@ -7773,7 +7958,7 @@
         <p:spPr/>
         <p:txBody>
           <a:bodyPr anchor="t">
-            <a:normAutofit fontScale="92500" lnSpcReduction="20000"/>
+            <a:normAutofit/>
           </a:bodyPr>
           <a:lstStyle/>
           <a:p>
@@ -7787,13 +7972,6 @@
             <a:r>
               <a:rPr lang="en-US" sz="2600" dirty="0"/>
               <a:t> Splitting Prediction models by category </a:t>
-            </a:r>
-          </a:p>
-          <a:p>
-            <a:pPr lvl="1"/>
-            <a:r>
-              <a:rPr lang="en-US" sz="2600" dirty="0"/>
-              <a:t>Investigate the option to use Google Trends API for collecting “post funding” success data for gaining additional insights on success rate</a:t>
             </a:r>
           </a:p>
           <a:p>
@@ -7940,7 +8118,7 @@
           <p:nvPr/>
         </p:nvPicPr>
         <p:blipFill rotWithShape="1">
-          <a:blip r:embed="rId2" cstate="screen">
+          <a:blip r:embed="rId3" cstate="screen">
             <a:extLst>
               <a:ext uri="{28A0092B-C50C-407E-A947-70E740481C1C}">
                 <a14:useLocalDpi xmlns:a14="http://schemas.microsoft.com/office/drawing/2010/main"/>
@@ -8298,7 +8476,7 @@
 </file>
 
 <file path=ppt/slides/slide2.xml><?xml version="1.0" encoding="utf-8"?>
-<p:sld xmlns:a="http://schemas.openxmlformats.org/drawingml/2006/main" xmlns:r="http://schemas.openxmlformats.org/officeDocument/2006/relationships" xmlns:p="http://schemas.openxmlformats.org/presentationml/2006/main" show="0">
+<p:sld xmlns:a="http://schemas.openxmlformats.org/drawingml/2006/main" xmlns:r="http://schemas.openxmlformats.org/officeDocument/2006/relationships" xmlns:p="http://schemas.openxmlformats.org/presentationml/2006/main">
   <p:cSld>
     <p:spTree>
       <p:nvGrpSpPr>
@@ -8912,7 +9090,7 @@
           <p:nvPr/>
         </p:nvPicPr>
         <p:blipFill>
-          <a:blip r:embed="rId2"/>
+          <a:blip r:embed="rId3"/>
           <a:stretch>
             <a:fillRect/>
           </a:stretch>
@@ -10791,11 +10969,12 @@
 </file>
 
 <file path=customXml/item1.xml><?xml version="1.0" encoding="utf-8"?>
-<p:properties xmlns:p="http://schemas.microsoft.com/office/2006/metadata/properties" xmlns:xsi="http://www.w3.org/2001/XMLSchema-instance" xmlns:pc="http://schemas.microsoft.com/office/infopath/2007/PartnerControls">
-  <documentManagement>
-    <MediaServiceKeyPoints xmlns="71af3243-3dd4-4a8d-8c0d-dd76da1f02a5" xsi:nil="true"/>
-  </documentManagement>
-</p:properties>
+<?mso-contentType ?>
+<FormTemplates xmlns="http://schemas.microsoft.com/sharepoint/v3/contenttype/forms">
+  <Display>DocumentLibraryForm</Display>
+  <Edit>DocumentLibraryForm</Edit>
+  <New>DocumentLibraryForm</New>
+</FormTemplates>
 </file>
 
 <file path=customXml/item2.xml><?xml version="1.0" encoding="utf-8"?>
@@ -11010,27 +11189,17 @@
 </file>
 
 <file path=customXml/item3.xml><?xml version="1.0" encoding="utf-8"?>
-<?mso-contentType ?>
-<FormTemplates xmlns="http://schemas.microsoft.com/sharepoint/v3/contenttype/forms">
-  <Display>DocumentLibraryForm</Display>
-  <Edit>DocumentLibraryForm</Edit>
-  <New>DocumentLibraryForm</New>
-</FormTemplates>
+<p:properties xmlns:p="http://schemas.microsoft.com/office/2006/metadata/properties" xmlns:xsi="http://www.w3.org/2001/XMLSchema-instance" xmlns:pc="http://schemas.microsoft.com/office/infopath/2007/PartnerControls">
+  <documentManagement>
+    <MediaServiceKeyPoints xmlns="71af3243-3dd4-4a8d-8c0d-dd76da1f02a5" xsi:nil="true"/>
+  </documentManagement>
+</p:properties>
 </file>
 
 <file path=customXml/itemProps1.xml><?xml version="1.0" encoding="utf-8"?>
-<ds:datastoreItem xmlns:ds="http://schemas.openxmlformats.org/officeDocument/2006/customXml" ds:itemID="{1EBC12AA-1C15-4500-BC9C-8EE83A441DE9}">
+<ds:datastoreItem xmlns:ds="http://schemas.openxmlformats.org/officeDocument/2006/customXml" ds:itemID="{BA0CF3B2-1F0F-4FC5-8002-3E4869ABAD55}">
   <ds:schemaRefs>
-    <ds:schemaRef ds:uri="http://schemas.microsoft.com/office/2006/documentManagement/types"/>
-    <ds:schemaRef ds:uri="71af3243-3dd4-4a8d-8c0d-dd76da1f02a5"/>
-    <ds:schemaRef ds:uri="16c05727-aa75-4e4a-9b5f-8a80a1165891"/>
-    <ds:schemaRef ds:uri="http://www.w3.org/XML/1998/namespace"/>
-    <ds:schemaRef ds:uri="http://schemas.microsoft.com/office/infopath/2007/PartnerControls"/>
-    <ds:schemaRef ds:uri="http://purl.org/dc/elements/1.1/"/>
-    <ds:schemaRef ds:uri="http://purl.org/dc/dcmitype/"/>
-    <ds:schemaRef ds:uri="http://schemas.openxmlformats.org/package/2006/metadata/core-properties"/>
-    <ds:schemaRef ds:uri="http://schemas.microsoft.com/office/2006/metadata/properties"/>
-    <ds:schemaRef ds:uri="http://purl.org/dc/terms/"/>
+    <ds:schemaRef ds:uri="http://schemas.microsoft.com/sharepoint/v3/contenttype/forms"/>
   </ds:schemaRefs>
 </ds:datastoreItem>
 </file>
@@ -11055,9 +11224,18 @@
 </file>
 
 <file path=customXml/itemProps3.xml><?xml version="1.0" encoding="utf-8"?>
-<ds:datastoreItem xmlns:ds="http://schemas.openxmlformats.org/officeDocument/2006/customXml" ds:itemID="{BA0CF3B2-1F0F-4FC5-8002-3E4869ABAD55}">
+<ds:datastoreItem xmlns:ds="http://schemas.openxmlformats.org/officeDocument/2006/customXml" ds:itemID="{1EBC12AA-1C15-4500-BC9C-8EE83A441DE9}">
   <ds:schemaRefs>
-    <ds:schemaRef ds:uri="http://schemas.microsoft.com/sharepoint/v3/contenttype/forms"/>
+    <ds:schemaRef ds:uri="http://schemas.microsoft.com/office/2006/documentManagement/types"/>
+    <ds:schemaRef ds:uri="71af3243-3dd4-4a8d-8c0d-dd76da1f02a5"/>
+    <ds:schemaRef ds:uri="16c05727-aa75-4e4a-9b5f-8a80a1165891"/>
+    <ds:schemaRef ds:uri="http://www.w3.org/XML/1998/namespace"/>
+    <ds:schemaRef ds:uri="http://schemas.microsoft.com/office/infopath/2007/PartnerControls"/>
+    <ds:schemaRef ds:uri="http://purl.org/dc/elements/1.1/"/>
+    <ds:schemaRef ds:uri="http://purl.org/dc/dcmitype/"/>
+    <ds:schemaRef ds:uri="http://schemas.openxmlformats.org/package/2006/metadata/core-properties"/>
+    <ds:schemaRef ds:uri="http://schemas.microsoft.com/office/2006/metadata/properties"/>
+    <ds:schemaRef ds:uri="http://purl.org/dc/terms/"/>
   </ds:schemaRefs>
 </ds:datastoreItem>
 </file>
</xml_diff>